<commit_message>
syllabus schedule and policy update
</commit_message>
<xml_diff>
--- a/_site/docs/CoursePolicy.pptx
+++ b/_site/docs/CoursePolicy.pptx
@@ -5,7 +5,7 @@
     <p:sldMasterId id="2147483648" r:id="rId1"/>
   </p:sldMasterIdLst>
   <p:notesMasterIdLst>
-    <p:notesMasterId r:id="rId14"/>
+    <p:notesMasterId r:id="rId15"/>
   </p:notesMasterIdLst>
   <p:sldIdLst>
     <p:sldId id="256" r:id="rId2"/>
@@ -13,13 +13,14 @@
     <p:sldId id="258" r:id="rId4"/>
     <p:sldId id="265" r:id="rId5"/>
     <p:sldId id="259" r:id="rId6"/>
-    <p:sldId id="261" r:id="rId7"/>
-    <p:sldId id="262" r:id="rId8"/>
-    <p:sldId id="266" r:id="rId9"/>
-    <p:sldId id="260" r:id="rId10"/>
-    <p:sldId id="267" r:id="rId11"/>
-    <p:sldId id="263" r:id="rId12"/>
-    <p:sldId id="264" r:id="rId13"/>
+    <p:sldId id="268" r:id="rId7"/>
+    <p:sldId id="261" r:id="rId8"/>
+    <p:sldId id="262" r:id="rId9"/>
+    <p:sldId id="266" r:id="rId10"/>
+    <p:sldId id="260" r:id="rId11"/>
+    <p:sldId id="267" r:id="rId12"/>
+    <p:sldId id="263" r:id="rId13"/>
+    <p:sldId id="264" r:id="rId14"/>
   </p:sldIdLst>
   <p:sldSz cx="9144000" cy="6858000" type="screen4x3"/>
   <p:notesSz cx="6858000" cy="9144000"/>
@@ -128,6 +129,7 @@
             <p14:sldId id="258"/>
             <p14:sldId id="265"/>
             <p14:sldId id="259"/>
+            <p14:sldId id="268"/>
             <p14:sldId id="261"/>
             <p14:sldId id="262"/>
             <p14:sldId id="266"/>
@@ -239,7 +241,7 @@
           <a:p>
             <a:fld id="{89855770-2AA3-43A4-9924-C8197CB04EA0}" type="datetimeFigureOut">
               <a:rPr lang="en-US" smtClean="0"/>
-              <a:t>12/27/2014</a:t>
+              <a:t>1/11/2015</a:t>
             </a:fld>
             <a:endParaRPr lang="en-US"/>
           </a:p>
@@ -572,7 +574,7 @@
           <a:p>
             <a:fld id="{34E5FF70-55B8-4FAD-BCE2-A4D3A44BBAF4}" type="slidenum">
               <a:rPr lang="en-US" smtClean="0"/>
-              <a:t>9</a:t>
+              <a:t>10</a:t>
             </a:fld>
             <a:endParaRPr lang="en-US"/>
           </a:p>
@@ -3694,6 +3696,13 @@
   <p:clrMapOvr>
     <a:masterClrMapping/>
   </p:clrMapOvr>
+  <p:timing>
+    <p:tnLst>
+      <p:par>
+        <p:cTn id="1" dur="indefinite" restart="never" nodeType="tmRoot"/>
+      </p:par>
+    </p:tnLst>
+  </p:timing>
 </p:sld>
 </file>
 
@@ -3750,25 +3759,111 @@
         <p:spPr>
           <a:xfrm>
             <a:off x="457200" y="1600200"/>
-            <a:ext cx="8229600" cy="4800600"/>
+            <a:ext cx="8229600" cy="4756150"/>
           </a:xfrm>
         </p:spPr>
         <p:txBody>
           <a:bodyPr>
-            <a:normAutofit/>
+            <a:normAutofit fontScale="85000" lnSpcReduction="20000"/>
           </a:bodyPr>
           <a:lstStyle/>
           <a:p>
             <a:r>
               <a:rPr lang="en-US" dirty="0" smtClean="0"/>
-              <a:t>If submit after the deadline without granted extension request</a:t>
+              <a:t>Homework</a:t>
             </a:r>
           </a:p>
           <a:p>
             <a:pPr lvl="1"/>
             <a:r>
               <a:rPr lang="en-US" dirty="0" smtClean="0"/>
-              <a:t>15% late penalty will be applied</a:t>
+              <a:t>Everyone will have one chance to ask for extension (extra three days after deadline)</a:t>
+            </a:r>
+          </a:p>
+          <a:p>
+            <a:pPr lvl="1"/>
+            <a:r>
+              <a:rPr lang="en-US" dirty="0" smtClean="0"/>
+              <a:t>Request must be made </a:t>
+            </a:r>
+            <a:r>
+              <a:rPr lang="en-US" b="1" dirty="0" smtClean="0"/>
+              <a:t>before</a:t>
+            </a:r>
+            <a:r>
+              <a:rPr lang="en-US" dirty="0" smtClean="0"/>
+              <a:t> the deadline!</a:t>
+            </a:r>
+          </a:p>
+          <a:p>
+            <a:r>
+              <a:rPr lang="en-US" dirty="0" smtClean="0"/>
+              <a:t>Quizzes</a:t>
+            </a:r>
+            <a:endParaRPr lang="en-US" dirty="0" smtClean="0"/>
+          </a:p>
+          <a:p>
+            <a:pPr lvl="1"/>
+            <a:r>
+              <a:rPr lang="en-US" b="1" dirty="0" smtClean="0"/>
+              <a:t>No</a:t>
+            </a:r>
+            <a:r>
+              <a:rPr lang="en-US" dirty="0" smtClean="0"/>
+              <a:t> make-up </a:t>
+            </a:r>
+            <a:r>
+              <a:rPr lang="en-US" dirty="0" smtClean="0"/>
+              <a:t>quizzes unless </a:t>
+            </a:r>
+            <a:r>
+              <a:rPr lang="en-US" dirty="0" smtClean="0"/>
+              <a:t>under emergency situation</a:t>
+            </a:r>
+          </a:p>
+          <a:p>
+            <a:r>
+              <a:rPr lang="en-US" dirty="0" smtClean="0"/>
+              <a:t>Paper presentation</a:t>
+            </a:r>
+          </a:p>
+          <a:p>
+            <a:pPr lvl="1"/>
+            <a:r>
+              <a:rPr lang="en-US" dirty="0" smtClean="0"/>
+              <a:t>Must be presented on your selected date</a:t>
+            </a:r>
+          </a:p>
+          <a:p>
+            <a:r>
+              <a:rPr lang="en-US" dirty="0"/>
+              <a:t>Course </a:t>
+            </a:r>
+            <a:r>
+              <a:rPr lang="en-US" dirty="0" smtClean="0"/>
+              <a:t>project</a:t>
+            </a:r>
+          </a:p>
+          <a:p>
+            <a:pPr lvl="1"/>
+            <a:r>
+              <a:rPr lang="en-US" dirty="0" smtClean="0"/>
+              <a:t>Proposal due early in the semester (~5</a:t>
+            </a:r>
+            <a:r>
+              <a:rPr lang="en-US" baseline="30000" dirty="0" smtClean="0"/>
+              <a:t>th</a:t>
+            </a:r>
+            <a:r>
+              <a:rPr lang="en-US" dirty="0" smtClean="0"/>
+              <a:t> week, no extension)</a:t>
+            </a:r>
+          </a:p>
+          <a:p>
+            <a:pPr lvl="1"/>
+            <a:r>
+              <a:rPr lang="en-US" dirty="0" smtClean="0"/>
+              <a:t>Final report due before presentation (no extension)</a:t>
             </a:r>
           </a:p>
           <a:p>
@@ -3846,105 +3941,10 @@
           </a:p>
         </p:txBody>
       </p:sp>
-      <p:sp>
-        <p:nvSpPr>
-          <p:cNvPr id="4" name="TextBox 3"/>
-          <p:cNvSpPr txBox="1"/>
-          <p:nvPr/>
-        </p:nvSpPr>
-        <p:spPr>
-          <a:xfrm>
-            <a:off x="3810000" y="4377645"/>
-            <a:ext cx="4572000" cy="954107"/>
-          </a:xfrm>
-          <a:prstGeom prst="rect">
-            <a:avLst/>
-          </a:prstGeom>
-          <a:noFill/>
-        </p:spPr>
-        <p:txBody>
-          <a:bodyPr wrap="square" rtlCol="0">
-            <a:spAutoFit/>
-          </a:bodyPr>
-          <a:lstStyle/>
-          <a:p>
-            <a:r>
-              <a:rPr lang="en-US" sz="2800" b="1" dirty="0" smtClean="0">
-                <a:solidFill>
-                  <a:srgbClr val="FF0000"/>
-                </a:solidFill>
-              </a:rPr>
-              <a:t>Fairness among all the students </a:t>
-            </a:r>
-            <a:r>
-              <a:rPr lang="en-US" sz="2800" b="1" dirty="0">
-                <a:solidFill>
-                  <a:srgbClr val="FF0000"/>
-                </a:solidFill>
-              </a:rPr>
-              <a:t>will be </a:t>
-            </a:r>
-            <a:r>
-              <a:rPr lang="en-US" sz="2800" b="1" dirty="0" smtClean="0">
-                <a:solidFill>
-                  <a:srgbClr val="FF0000"/>
-                </a:solidFill>
-              </a:rPr>
-              <a:t>guaranteed!</a:t>
-            </a:r>
-            <a:endParaRPr lang="en-US" sz="2800" b="1" dirty="0">
-              <a:solidFill>
-                <a:srgbClr val="FF0000"/>
-              </a:solidFill>
-            </a:endParaRPr>
-          </a:p>
-        </p:txBody>
-      </p:sp>
-      <p:pic>
-        <p:nvPicPr>
-          <p:cNvPr id="1026" name="Picture 2" descr="http://www.davenussbaum.com/wp-content/uploads/2012/06/blind-justice.jpg"/>
-          <p:cNvPicPr>
-            <a:picLocks noChangeAspect="1" noChangeArrowheads="1"/>
-          </p:cNvPicPr>
-          <p:nvPr/>
-        </p:nvPicPr>
-        <p:blipFill>
-          <a:blip r:embed="rId2">
-            <a:extLst>
-              <a:ext uri="{28A0092B-C50C-407E-A947-70E740481C1C}">
-                <a14:useLocalDpi xmlns:a14="http://schemas.microsoft.com/office/drawing/2010/main" val="0"/>
-              </a:ext>
-            </a:extLst>
-          </a:blip>
-          <a:srcRect/>
-          <a:stretch>
-            <a:fillRect/>
-          </a:stretch>
-        </p:blipFill>
-        <p:spPr bwMode="auto">
-          <a:xfrm>
-            <a:off x="874190" y="3429000"/>
-            <a:ext cx="2935810" cy="2927350"/>
-          </a:xfrm>
-          <a:prstGeom prst="rect">
-            <a:avLst/>
-          </a:prstGeom>
-          <a:noFill/>
-          <a:extLst>
-            <a:ext uri="{909E8E84-426E-40DD-AFC4-6F175D3DCCD1}">
-              <a14:hiddenFill xmlns:a14="http://schemas.microsoft.com/office/drawing/2010/main">
-                <a:solidFill>
-                  <a:srgbClr val="FFFFFF"/>
-                </a:solidFill>
-              </a14:hiddenFill>
-            </a:ext>
-          </a:extLst>
-        </p:spPr>
-      </p:pic>
     </p:spTree>
     <p:extLst>
       <p:ext uri="{BB962C8B-B14F-4D97-AF65-F5344CB8AC3E}">
-        <p14:creationId xmlns:p14="http://schemas.microsoft.com/office/powerpoint/2010/main" val="371368407"/>
+        <p14:creationId xmlns:p14="http://schemas.microsoft.com/office/powerpoint/2010/main" val="954530267"/>
       </p:ext>
     </p:extLst>
   </p:cSld>
@@ -3995,7 +3995,7 @@
           <a:p>
             <a:r>
               <a:rPr lang="en-US" dirty="0" smtClean="0"/>
-              <a:t>Contact information</a:t>
+              <a:t>Late policy</a:t>
             </a:r>
             <a:endParaRPr lang="en-US" dirty="0"/>
           </a:p>
@@ -4014,143 +4014,29 @@
         <p:spPr>
           <a:xfrm>
             <a:off x="457200" y="1600200"/>
-            <a:ext cx="8229600" cy="4756150"/>
+            <a:ext cx="8229600" cy="4800600"/>
           </a:xfrm>
         </p:spPr>
         <p:txBody>
           <a:bodyPr>
-            <a:normAutofit fontScale="85000" lnSpcReduction="20000"/>
+            <a:normAutofit/>
           </a:bodyPr>
           <a:lstStyle/>
           <a:p>
             <a:r>
               <a:rPr lang="en-US" dirty="0" smtClean="0"/>
-              <a:t>Lecture </a:t>
+              <a:t>If submit after the deadline without granted extension </a:t>
             </a:r>
           </a:p>
           <a:p>
             <a:pPr lvl="1"/>
             <a:r>
               <a:rPr lang="en-US" dirty="0" smtClean="0"/>
-              <a:t>Instructor: </a:t>
-            </a:r>
-            <a:r>
-              <a:rPr lang="en-US" dirty="0" err="1" smtClean="0"/>
-              <a:t>Hongning</a:t>
-            </a:r>
-            <a:r>
-              <a:rPr lang="en-US" dirty="0" smtClean="0"/>
-              <a:t> Wang</a:t>
+              <a:t>15% late penalty will be applied</a:t>
             </a:r>
           </a:p>
           <a:p>
             <a:pPr lvl="1"/>
-            <a:r>
-              <a:rPr lang="en-US" dirty="0" smtClean="0"/>
-              <a:t>Time: Tuesday/Thursday 9:30am to 10:45am</a:t>
-            </a:r>
-          </a:p>
-          <a:p>
-            <a:pPr lvl="1"/>
-            <a:r>
-              <a:rPr lang="en-US" dirty="0" smtClean="0"/>
-              <a:t>Location: </a:t>
-            </a:r>
-            <a:r>
-              <a:rPr lang="en-US" dirty="0"/>
-              <a:t>Rice Hall </a:t>
-            </a:r>
-            <a:r>
-              <a:rPr lang="en-US" dirty="0" smtClean="0"/>
-              <a:t>340</a:t>
-            </a:r>
-          </a:p>
-          <a:p>
-            <a:r>
-              <a:rPr lang="en-US" dirty="0" smtClean="0"/>
-              <a:t>Office hour</a:t>
-            </a:r>
-          </a:p>
-          <a:p>
-            <a:pPr lvl="1"/>
-            <a:r>
-              <a:rPr lang="en-US" dirty="0" smtClean="0"/>
-              <a:t>Instructor’s</a:t>
-            </a:r>
-          </a:p>
-          <a:p>
-            <a:pPr lvl="2"/>
-            <a:r>
-              <a:rPr lang="en-US" dirty="0" smtClean="0"/>
-              <a:t>Time</a:t>
-            </a:r>
-            <a:r>
-              <a:rPr lang="en-US" dirty="0"/>
-              <a:t>: </a:t>
-            </a:r>
-            <a:r>
-              <a:rPr lang="en-US" dirty="0" smtClean="0"/>
-              <a:t>Thursday 11am </a:t>
-            </a:r>
-            <a:r>
-              <a:rPr lang="en-US" dirty="0"/>
-              <a:t>to </a:t>
-            </a:r>
-            <a:r>
-              <a:rPr lang="en-US" dirty="0" smtClean="0"/>
-              <a:t>12pm</a:t>
-            </a:r>
-            <a:endParaRPr lang="en-US" dirty="0"/>
-          </a:p>
-          <a:p>
-            <a:pPr lvl="2"/>
-            <a:r>
-              <a:rPr lang="en-US" dirty="0"/>
-              <a:t>Location: </a:t>
-            </a:r>
-            <a:r>
-              <a:rPr lang="en-US" dirty="0" smtClean="0"/>
-              <a:t>Rice Hall 408</a:t>
-            </a:r>
-          </a:p>
-          <a:p>
-            <a:r>
-              <a:rPr lang="en-US" dirty="0" smtClean="0"/>
-              <a:t>Course website</a:t>
-            </a:r>
-          </a:p>
-          <a:p>
-            <a:pPr lvl="1"/>
-            <a:r>
-              <a:rPr lang="en-US" dirty="0"/>
-              <a:t>Website: </a:t>
-            </a:r>
-            <a:r>
-              <a:rPr lang="en-US" dirty="0">
-                <a:hlinkClick r:id="rId2"/>
-              </a:rPr>
-              <a:t>http://www.cs.virginia.edu/~hw5x/Course/Text-Mining-2015-Spring/_</a:t>
-            </a:r>
-            <a:r>
-              <a:rPr lang="en-US" dirty="0" smtClean="0">
-                <a:hlinkClick r:id="rId2"/>
-              </a:rPr>
-              <a:t>site</a:t>
-            </a:r>
-            <a:endParaRPr lang="en-US" dirty="0" smtClean="0"/>
-          </a:p>
-          <a:p>
-            <a:pPr lvl="1"/>
-            <a:r>
-              <a:rPr lang="en-US" dirty="0" smtClean="0"/>
-              <a:t>Piazza: </a:t>
-            </a:r>
-            <a:r>
-              <a:rPr lang="en-US" dirty="0">
-                <a:hlinkClick r:id="rId3"/>
-              </a:rPr>
-              <a:t>https://piazza.com/class/i3zaobi7ivhlx</a:t>
-            </a:r>
             <a:endParaRPr lang="en-US" dirty="0"/>
           </a:p>
         </p:txBody>
@@ -4224,10 +4110,120 @@
           </a:p>
         </p:txBody>
       </p:sp>
+      <p:grpSp>
+        <p:nvGrpSpPr>
+          <p:cNvPr id="5" name="Group 4"/>
+          <p:cNvGrpSpPr/>
+          <p:nvPr/>
+        </p:nvGrpSpPr>
+        <p:grpSpPr>
+          <a:xfrm>
+            <a:off x="874190" y="3429000"/>
+            <a:ext cx="7507810" cy="2927350"/>
+            <a:chOff x="874190" y="3429000"/>
+            <a:chExt cx="7507810" cy="2927350"/>
+          </a:xfrm>
+        </p:grpSpPr>
+        <p:sp>
+          <p:nvSpPr>
+            <p:cNvPr id="4" name="TextBox 3"/>
+            <p:cNvSpPr txBox="1"/>
+            <p:nvPr/>
+          </p:nvSpPr>
+          <p:spPr>
+            <a:xfrm>
+              <a:off x="3810000" y="4377645"/>
+              <a:ext cx="4572000" cy="954107"/>
+            </a:xfrm>
+            <a:prstGeom prst="rect">
+              <a:avLst/>
+            </a:prstGeom>
+            <a:noFill/>
+          </p:spPr>
+          <p:txBody>
+            <a:bodyPr wrap="square" rtlCol="0">
+              <a:spAutoFit/>
+            </a:bodyPr>
+            <a:lstStyle/>
+            <a:p>
+              <a:r>
+                <a:rPr lang="en-US" sz="2800" b="1" dirty="0" smtClean="0">
+                  <a:solidFill>
+                    <a:srgbClr val="FF0000"/>
+                  </a:solidFill>
+                </a:rPr>
+                <a:t>Fairness among all the students </a:t>
+              </a:r>
+              <a:r>
+                <a:rPr lang="en-US" sz="2800" b="1" dirty="0">
+                  <a:solidFill>
+                    <a:srgbClr val="FF0000"/>
+                  </a:solidFill>
+                </a:rPr>
+                <a:t>will be </a:t>
+              </a:r>
+              <a:r>
+                <a:rPr lang="en-US" sz="2800" b="1" dirty="0" smtClean="0">
+                  <a:solidFill>
+                    <a:srgbClr val="FF0000"/>
+                  </a:solidFill>
+                </a:rPr>
+                <a:t>guaranteed!</a:t>
+              </a:r>
+              <a:endParaRPr lang="en-US" sz="2800" b="1" dirty="0">
+                <a:solidFill>
+                  <a:srgbClr val="FF0000"/>
+                </a:solidFill>
+              </a:endParaRPr>
+            </a:p>
+          </p:txBody>
+        </p:sp>
+        <p:pic>
+          <p:nvPicPr>
+            <p:cNvPr id="1026" name="Picture 2" descr="http://www.davenussbaum.com/wp-content/uploads/2012/06/blind-justice.jpg"/>
+            <p:cNvPicPr>
+              <a:picLocks noChangeAspect="1" noChangeArrowheads="1"/>
+            </p:cNvPicPr>
+            <p:nvPr/>
+          </p:nvPicPr>
+          <p:blipFill>
+            <a:blip r:embed="rId2">
+              <a:extLst>
+                <a:ext uri="{28A0092B-C50C-407E-A947-70E740481C1C}">
+                  <a14:useLocalDpi xmlns:a14="http://schemas.microsoft.com/office/drawing/2010/main" val="0"/>
+                </a:ext>
+              </a:extLst>
+            </a:blip>
+            <a:srcRect/>
+            <a:stretch>
+              <a:fillRect/>
+            </a:stretch>
+          </p:blipFill>
+          <p:spPr bwMode="auto">
+            <a:xfrm>
+              <a:off x="874190" y="3429000"/>
+              <a:ext cx="2935810" cy="2927350"/>
+            </a:xfrm>
+            <a:prstGeom prst="rect">
+              <a:avLst/>
+            </a:prstGeom>
+            <a:noFill/>
+            <a:extLst>
+              <a:ext uri="{909E8E84-426E-40DD-AFC4-6F175D3DCCD1}">
+                <a14:hiddenFill xmlns:a14="http://schemas.microsoft.com/office/drawing/2010/main">
+                  <a:solidFill>
+                    <a:srgbClr val="FFFFFF"/>
+                  </a:solidFill>
+                </a14:hiddenFill>
+              </a:ext>
+            </a:extLst>
+          </p:spPr>
+        </p:pic>
+      </p:grpSp>
     </p:spTree>
     <p:extLst>
       <p:ext uri="{BB962C8B-B14F-4D97-AF65-F5344CB8AC3E}">
-        <p14:creationId xmlns:p14="http://schemas.microsoft.com/office/powerpoint/2010/main" val="3745411287"/>
+        <p14:creationId xmlns:p14="http://schemas.microsoft.com/office/powerpoint/2010/main" val="371368407"/>
       </p:ext>
     </p:extLst>
   </p:cSld>
@@ -4237,7 +4233,75 @@
   <p:timing>
     <p:tnLst>
       <p:par>
-        <p:cTn id="1" dur="indefinite" restart="never" nodeType="tmRoot"/>
+        <p:cTn id="1" dur="indefinite" restart="never" nodeType="tmRoot">
+          <p:childTnLst>
+            <p:seq concurrent="1" nextAc="seek">
+              <p:cTn id="2" dur="indefinite" nodeType="mainSeq">
+                <p:childTnLst>
+                  <p:par>
+                    <p:cTn id="3" fill="hold">
+                      <p:stCondLst>
+                        <p:cond delay="indefinite"/>
+                      </p:stCondLst>
+                      <p:childTnLst>
+                        <p:par>
+                          <p:cTn id="4" fill="hold">
+                            <p:stCondLst>
+                              <p:cond delay="0"/>
+                            </p:stCondLst>
+                            <p:childTnLst>
+                              <p:par>
+                                <p:cTn id="5" presetID="1" presetClass="entr" presetSubtype="0" fill="hold" nodeType="clickEffect">
+                                  <p:stCondLst>
+                                    <p:cond delay="0"/>
+                                  </p:stCondLst>
+                                  <p:childTnLst>
+                                    <p:set>
+                                      <p:cBhvr>
+                                        <p:cTn id="6" dur="1" fill="hold">
+                                          <p:stCondLst>
+                                            <p:cond delay="0"/>
+                                          </p:stCondLst>
+                                        </p:cTn>
+                                        <p:tgtEl>
+                                          <p:spTgt spid="5"/>
+                                        </p:tgtEl>
+                                        <p:attrNameLst>
+                                          <p:attrName>style.visibility</p:attrName>
+                                        </p:attrNameLst>
+                                      </p:cBhvr>
+                                      <p:to>
+                                        <p:strVal val="visible"/>
+                                      </p:to>
+                                    </p:set>
+                                  </p:childTnLst>
+                                </p:cTn>
+                              </p:par>
+                            </p:childTnLst>
+                          </p:cTn>
+                        </p:par>
+                      </p:childTnLst>
+                    </p:cTn>
+                  </p:par>
+                </p:childTnLst>
+              </p:cTn>
+              <p:prevCondLst>
+                <p:cond evt="onPrev" delay="0">
+                  <p:tgtEl>
+                    <p:sldTgt/>
+                  </p:tgtEl>
+                </p:cond>
+              </p:prevCondLst>
+              <p:nextCondLst>
+                <p:cond evt="onNext" delay="0">
+                  <p:tgtEl>
+                    <p:sldTgt/>
+                  </p:tgtEl>
+                </p:cond>
+              </p:nextCondLst>
+            </p:seq>
+          </p:childTnLst>
+        </p:cTn>
       </p:par>
     </p:tnLst>
   </p:timing>
@@ -4263,6 +4327,289 @@
       </p:grpSpPr>
       <p:sp>
         <p:nvSpPr>
+          <p:cNvPr id="2" name="Title 1"/>
+          <p:cNvSpPr>
+            <a:spLocks noGrp="1"/>
+          </p:cNvSpPr>
+          <p:nvPr>
+            <p:ph type="title"/>
+          </p:nvPr>
+        </p:nvSpPr>
+        <p:spPr/>
+        <p:txBody>
+          <a:bodyPr/>
+          <a:lstStyle/>
+          <a:p>
+            <a:r>
+              <a:rPr lang="en-US" dirty="0" smtClean="0"/>
+              <a:t>Contact information</a:t>
+            </a:r>
+            <a:endParaRPr lang="en-US" dirty="0"/>
+          </a:p>
+        </p:txBody>
+      </p:sp>
+      <p:sp>
+        <p:nvSpPr>
+          <p:cNvPr id="3" name="Content Placeholder 2"/>
+          <p:cNvSpPr>
+            <a:spLocks noGrp="1"/>
+          </p:cNvSpPr>
+          <p:nvPr>
+            <p:ph idx="1"/>
+          </p:nvPr>
+        </p:nvSpPr>
+        <p:spPr>
+          <a:xfrm>
+            <a:off x="457200" y="1600200"/>
+            <a:ext cx="8229600" cy="4756150"/>
+          </a:xfrm>
+        </p:spPr>
+        <p:txBody>
+          <a:bodyPr>
+            <a:normAutofit fontScale="85000" lnSpcReduction="20000"/>
+          </a:bodyPr>
+          <a:lstStyle/>
+          <a:p>
+            <a:r>
+              <a:rPr lang="en-US" dirty="0" smtClean="0"/>
+              <a:t>Lecture </a:t>
+            </a:r>
+          </a:p>
+          <a:p>
+            <a:pPr lvl="1"/>
+            <a:r>
+              <a:rPr lang="en-US" dirty="0" smtClean="0"/>
+              <a:t>Instructor: </a:t>
+            </a:r>
+            <a:r>
+              <a:rPr lang="en-US" dirty="0" err="1" smtClean="0"/>
+              <a:t>Hongning</a:t>
+            </a:r>
+            <a:r>
+              <a:rPr lang="en-US" dirty="0" smtClean="0"/>
+              <a:t> Wang</a:t>
+            </a:r>
+          </a:p>
+          <a:p>
+            <a:pPr lvl="1"/>
+            <a:r>
+              <a:rPr lang="en-US" dirty="0" smtClean="0"/>
+              <a:t>Time: Tuesday/Thursday 9:30am to 10:45am</a:t>
+            </a:r>
+          </a:p>
+          <a:p>
+            <a:pPr lvl="1"/>
+            <a:r>
+              <a:rPr lang="en-US" dirty="0" smtClean="0"/>
+              <a:t>Location: </a:t>
+            </a:r>
+            <a:r>
+              <a:rPr lang="en-US" dirty="0"/>
+              <a:t>Rice Hall </a:t>
+            </a:r>
+            <a:r>
+              <a:rPr lang="en-US" dirty="0" smtClean="0"/>
+              <a:t>340</a:t>
+            </a:r>
+          </a:p>
+          <a:p>
+            <a:r>
+              <a:rPr lang="en-US" dirty="0" smtClean="0"/>
+              <a:t>Office hour</a:t>
+            </a:r>
+          </a:p>
+          <a:p>
+            <a:pPr lvl="1"/>
+            <a:r>
+              <a:rPr lang="en-US" dirty="0" smtClean="0"/>
+              <a:t>Instructor’s</a:t>
+            </a:r>
+          </a:p>
+          <a:p>
+            <a:pPr lvl="2"/>
+            <a:r>
+              <a:rPr lang="en-US" dirty="0" smtClean="0"/>
+              <a:t>Time</a:t>
+            </a:r>
+            <a:r>
+              <a:rPr lang="en-US" dirty="0"/>
+              <a:t>: </a:t>
+            </a:r>
+            <a:r>
+              <a:rPr lang="en-US" dirty="0" smtClean="0"/>
+              <a:t>Thursday 11am </a:t>
+            </a:r>
+            <a:r>
+              <a:rPr lang="en-US" dirty="0"/>
+              <a:t>to </a:t>
+            </a:r>
+            <a:r>
+              <a:rPr lang="en-US" dirty="0" smtClean="0"/>
+              <a:t>12pm</a:t>
+            </a:r>
+            <a:endParaRPr lang="en-US" dirty="0"/>
+          </a:p>
+          <a:p>
+            <a:pPr lvl="2"/>
+            <a:r>
+              <a:rPr lang="en-US" dirty="0"/>
+              <a:t>Location: </a:t>
+            </a:r>
+            <a:r>
+              <a:rPr lang="en-US" dirty="0" smtClean="0"/>
+              <a:t>Rice Hall 408</a:t>
+            </a:r>
+          </a:p>
+          <a:p>
+            <a:r>
+              <a:rPr lang="en-US" dirty="0" smtClean="0"/>
+              <a:t>Course website</a:t>
+            </a:r>
+          </a:p>
+          <a:p>
+            <a:pPr lvl="1"/>
+            <a:r>
+              <a:rPr lang="en-US" dirty="0"/>
+              <a:t>Website: </a:t>
+            </a:r>
+            <a:r>
+              <a:rPr lang="en-US" dirty="0">
+                <a:hlinkClick r:id="rId2"/>
+              </a:rPr>
+              <a:t>http://www.cs.virginia.edu/~hw5x/Course/Text-Mining-2015-Spring/_</a:t>
+            </a:r>
+            <a:r>
+              <a:rPr lang="en-US" dirty="0" smtClean="0">
+                <a:hlinkClick r:id="rId2"/>
+              </a:rPr>
+              <a:t>site</a:t>
+            </a:r>
+            <a:endParaRPr lang="en-US" dirty="0" smtClean="0"/>
+          </a:p>
+          <a:p>
+            <a:pPr lvl="1"/>
+            <a:r>
+              <a:rPr lang="en-US" dirty="0" smtClean="0"/>
+              <a:t>Piazza: </a:t>
+            </a:r>
+            <a:r>
+              <a:rPr lang="en-US" dirty="0">
+                <a:hlinkClick r:id="rId3"/>
+              </a:rPr>
+              <a:t>https://piazza.com/class/i3zaobi7ivhlx</a:t>
+            </a:r>
+            <a:endParaRPr lang="en-US" dirty="0"/>
+          </a:p>
+        </p:txBody>
+      </p:sp>
+      <p:sp>
+        <p:nvSpPr>
+          <p:cNvPr id="6" name="Date Placeholder 5"/>
+          <p:cNvSpPr>
+            <a:spLocks noGrp="1"/>
+          </p:cNvSpPr>
+          <p:nvPr>
+            <p:ph type="dt" sz="half" idx="10"/>
+          </p:nvPr>
+        </p:nvSpPr>
+        <p:spPr/>
+        <p:txBody>
+          <a:bodyPr/>
+          <a:lstStyle/>
+          <a:p>
+            <a:r>
+              <a:rPr lang="en-US" smtClean="0"/>
+              <a:t>CS@UVa</a:t>
+            </a:r>
+            <a:endParaRPr lang="en-US"/>
+          </a:p>
+        </p:txBody>
+      </p:sp>
+      <p:sp>
+        <p:nvSpPr>
+          <p:cNvPr id="7" name="Footer Placeholder 6"/>
+          <p:cNvSpPr>
+            <a:spLocks noGrp="1"/>
+          </p:cNvSpPr>
+          <p:nvPr>
+            <p:ph type="ftr" sz="quarter" idx="11"/>
+          </p:nvPr>
+        </p:nvSpPr>
+        <p:spPr/>
+        <p:txBody>
+          <a:bodyPr/>
+          <a:lstStyle/>
+          <a:p>
+            <a:r>
+              <a:rPr lang="en-US" smtClean="0"/>
+              <a:t>CS6501: Text Mining</a:t>
+            </a:r>
+            <a:endParaRPr lang="en-US"/>
+          </a:p>
+        </p:txBody>
+      </p:sp>
+      <p:sp>
+        <p:nvSpPr>
+          <p:cNvPr id="8" name="Slide Number Placeholder 7"/>
+          <p:cNvSpPr>
+            <a:spLocks noGrp="1"/>
+          </p:cNvSpPr>
+          <p:nvPr>
+            <p:ph type="sldNum" sz="quarter" idx="12"/>
+          </p:nvPr>
+        </p:nvSpPr>
+        <p:spPr/>
+        <p:txBody>
+          <a:bodyPr/>
+          <a:lstStyle/>
+          <a:p>
+            <a:fld id="{8B73B576-4618-475D-9FCB-4FE0D483ACFE}" type="slidenum">
+              <a:rPr lang="en-US" smtClean="0"/>
+              <a:t>12</a:t>
+            </a:fld>
+            <a:endParaRPr lang="en-US"/>
+          </a:p>
+        </p:txBody>
+      </p:sp>
+    </p:spTree>
+    <p:extLst>
+      <p:ext uri="{BB962C8B-B14F-4D97-AF65-F5344CB8AC3E}">
+        <p14:creationId xmlns:p14="http://schemas.microsoft.com/office/powerpoint/2010/main" val="3745411287"/>
+      </p:ext>
+    </p:extLst>
+  </p:cSld>
+  <p:clrMapOvr>
+    <a:masterClrMapping/>
+  </p:clrMapOvr>
+  <p:timing>
+    <p:tnLst>
+      <p:par>
+        <p:cTn id="1" dur="indefinite" restart="never" nodeType="tmRoot"/>
+      </p:par>
+    </p:tnLst>
+  </p:timing>
+</p:sld>
+</file>
+
+<file path=ppt/slides/slide13.xml><?xml version="1.0" encoding="utf-8"?>
+<p:sld xmlns:a="http://schemas.openxmlformats.org/drawingml/2006/main" xmlns:r="http://schemas.openxmlformats.org/officeDocument/2006/relationships" xmlns:p="http://schemas.openxmlformats.org/presentationml/2006/main">
+  <p:cSld>
+    <p:spTree>
+      <p:nvGrpSpPr>
+        <p:cNvPr id="1" name=""/>
+        <p:cNvGrpSpPr/>
+        <p:nvPr/>
+      </p:nvGrpSpPr>
+      <p:grpSpPr>
+        <a:xfrm>
+          <a:off x="0" y="0"/>
+          <a:ext cx="0" cy="0"/>
+          <a:chOff x="0" y="0"/>
+          <a:chExt cx="0" cy="0"/>
+        </a:xfrm>
+      </p:grpSpPr>
+      <p:sp>
+        <p:nvSpPr>
           <p:cNvPr id="4" name="Title 3"/>
           <p:cNvSpPr>
             <a:spLocks noGrp="1"/>
@@ -4370,7 +4717,7 @@
           <a:p>
             <a:fld id="{8B73B576-4618-475D-9FCB-4FE0D483ACFE}" type="slidenum">
               <a:rPr lang="en-US" smtClean="0"/>
-              <a:t>12</a:t>
+              <a:t>13</a:t>
             </a:fld>
             <a:endParaRPr lang="en-US"/>
           </a:p>
@@ -4386,6 +4733,13 @@
   <p:clrMapOvr>
     <a:masterClrMapping/>
   </p:clrMapOvr>
+  <p:timing>
+    <p:tnLst>
+      <p:par>
+        <p:cTn id="1" dur="indefinite" restart="never" nodeType="tmRoot"/>
+      </p:par>
+    </p:tnLst>
+  </p:timing>
 </p:sld>
 </file>
 
@@ -4469,8 +4823,20 @@
             <a:pPr lvl="2"/>
             <a:r>
               <a:rPr lang="en-US" sz="2000" dirty="0" smtClean="0"/>
-              <a:t>Document classification/clustering</a:t>
-            </a:r>
+              <a:t>Document </a:t>
+            </a:r>
+            <a:r>
+              <a:rPr lang="en-US" sz="2000" dirty="0" smtClean="0"/>
+              <a:t>classification/clustering</a:t>
+            </a:r>
+          </a:p>
+          <a:p>
+            <a:pPr lvl="2"/>
+            <a:r>
+              <a:rPr lang="en-US" sz="2000" dirty="0" smtClean="0"/>
+              <a:t>Topic modeling</a:t>
+            </a:r>
+            <a:endParaRPr lang="en-US" sz="2000" dirty="0" smtClean="0"/>
           </a:p>
           <a:p>
             <a:pPr lvl="2"/>
@@ -4580,6 +4946,13 @@
   <p:clrMapOvr>
     <a:masterClrMapping/>
   </p:clrMapOvr>
+  <p:timing>
+    <p:tnLst>
+      <p:par>
+        <p:cTn id="1" dur="indefinite" restart="never" nodeType="tmRoot"/>
+      </p:par>
+    </p:tnLst>
+  </p:timing>
 </p:sld>
 </file>
 
@@ -4661,8 +5034,21 @@
             <a:pPr lvl="1"/>
             <a:r>
               <a:rPr lang="en-US" dirty="0" smtClean="0"/>
-              <a:t>Introduce state-of-the-art large scale text processing techniques</a:t>
-            </a:r>
+              <a:t>Introduce state-of-the-art </a:t>
+            </a:r>
+            <a:r>
+              <a:rPr lang="en-US" dirty="0" smtClean="0"/>
+              <a:t>large-scale </a:t>
+            </a:r>
+            <a:r>
+              <a:rPr lang="en-US" dirty="0" smtClean="0"/>
+              <a:t>text </a:t>
+            </a:r>
+            <a:r>
+              <a:rPr lang="en-US" dirty="0" smtClean="0"/>
+              <a:t>analytics techniques</a:t>
+            </a:r>
+            <a:endParaRPr lang="en-US" dirty="0" smtClean="0"/>
           </a:p>
           <a:p>
             <a:pPr lvl="2"/>
@@ -4769,6 +5155,13 @@
   <p:clrMapOvr>
     <a:masterClrMapping/>
   </p:clrMapOvr>
+  <p:timing>
+    <p:tnLst>
+      <p:par>
+        <p:cTn id="1" dur="indefinite" restart="never" nodeType="tmRoot"/>
+      </p:par>
+    </p:tnLst>
+  </p:timing>
 </p:sld>
 </file>
 
@@ -4806,7 +5199,7 @@
           <a:p>
             <a:r>
               <a:rPr lang="en-US" dirty="0" smtClean="0"/>
-              <a:t>Prerequisite</a:t>
+              <a:t>Prerequisites</a:t>
             </a:r>
             <a:endParaRPr lang="en-US" dirty="0"/>
           </a:p>
@@ -5295,15 +5688,10 @@
             <p:ph idx="1"/>
           </p:nvPr>
         </p:nvSpPr>
-        <p:spPr>
-          <a:xfrm>
-            <a:off x="457200" y="1600200"/>
-            <a:ext cx="8229600" cy="4800600"/>
-          </a:xfrm>
-        </p:spPr>
+        <p:spPr/>
         <p:txBody>
           <a:bodyPr>
-            <a:normAutofit lnSpcReduction="10000"/>
+            <a:normAutofit fontScale="92500" lnSpcReduction="20000"/>
           </a:bodyPr>
           <a:lstStyle/>
           <a:p>
@@ -5313,33 +5701,59 @@
             </a:r>
             <a:r>
               <a:rPr lang="en-US" dirty="0" smtClean="0"/>
-              <a:t>(40%)</a:t>
+              <a:t>(30</a:t>
+            </a:r>
+            <a:r>
+              <a:rPr lang="en-US" dirty="0" smtClean="0"/>
+              <a:t>%)</a:t>
+            </a:r>
+          </a:p>
+          <a:p>
+            <a:pPr lvl="1"/>
+            <a:r>
+              <a:rPr lang="en-US" dirty="0" smtClean="0"/>
+              <a:t>Machine problems (~4</a:t>
+            </a:r>
+            <a:r>
+              <a:rPr lang="en-US" dirty="0" smtClean="0"/>
+              <a:t>)</a:t>
+            </a:r>
+          </a:p>
+          <a:p>
+            <a:r>
+              <a:rPr lang="en-US" dirty="0" smtClean="0"/>
+              <a:t>In-class quizzes (15%)</a:t>
+            </a:r>
+          </a:p>
+          <a:p>
+            <a:pPr lvl="1"/>
+            <a:r>
+              <a:rPr lang="en-US" dirty="0" smtClean="0"/>
+              <a:t>To review the learned concepts (~5)</a:t>
             </a:r>
             <a:endParaRPr lang="en-US" dirty="0" smtClean="0"/>
           </a:p>
           <a:p>
+            <a:r>
+              <a:rPr lang="en-US" dirty="0" smtClean="0"/>
+              <a:t>Paper presentation (20%)</a:t>
+            </a:r>
+          </a:p>
+          <a:p>
             <a:pPr lvl="1"/>
             <a:r>
               <a:rPr lang="en-US" dirty="0" smtClean="0"/>
-              <a:t>Machine problems (~</a:t>
-            </a:r>
-            <a:r>
-              <a:rPr lang="en-US" dirty="0" smtClean="0"/>
-              <a:t>4)</a:t>
-            </a:r>
-          </a:p>
-          <a:p>
-            <a:r>
-              <a:rPr lang="en-US" dirty="0" smtClean="0"/>
-              <a:t>Paper </a:t>
-            </a:r>
-            <a:r>
-              <a:rPr lang="en-US" dirty="0" smtClean="0"/>
-              <a:t>presentation </a:t>
-            </a:r>
-            <a:r>
-              <a:rPr lang="en-US" dirty="0" smtClean="0"/>
-              <a:t>(20%)</a:t>
+              <a:t>Graded by peer-review</a:t>
+            </a:r>
+          </a:p>
+          <a:p>
+            <a:r>
+              <a:rPr lang="en-US" dirty="0" smtClean="0"/>
+              <a:t>Course project </a:t>
+            </a:r>
+            <a:r>
+              <a:rPr lang="en-US" dirty="0" smtClean="0"/>
+              <a:t>(35%)</a:t>
             </a:r>
             <a:endParaRPr lang="en-US" dirty="0" smtClean="0"/>
           </a:p>
@@ -5347,32 +5761,7 @@
             <a:pPr lvl="1"/>
             <a:r>
               <a:rPr lang="en-US" dirty="0" smtClean="0"/>
-              <a:t>Graded by peer-review</a:t>
-            </a:r>
-          </a:p>
-          <a:p>
-            <a:r>
-              <a:rPr lang="en-US" dirty="0" smtClean="0"/>
-              <a:t>Course project (</a:t>
-            </a:r>
-            <a:r>
-              <a:rPr lang="en-US" dirty="0" smtClean="0"/>
-              <a:t>45%)</a:t>
-            </a:r>
-            <a:endParaRPr lang="en-US" dirty="0" smtClean="0"/>
-          </a:p>
-          <a:p>
-            <a:pPr lvl="1"/>
-            <a:r>
-              <a:rPr lang="en-US" dirty="0" smtClean="0"/>
               <a:t>Research/development-oriented</a:t>
-            </a:r>
-          </a:p>
-          <a:p>
-            <a:pPr lvl="1"/>
-            <a:r>
-              <a:rPr lang="en-US" dirty="0" smtClean="0"/>
-              <a:t>Work in group</a:t>
             </a:r>
           </a:p>
           <a:p>
@@ -5382,7 +5771,15 @@
             </a:r>
             <a:r>
               <a:rPr lang="en-US" dirty="0" smtClean="0"/>
-              <a:t>exams!</a:t>
+              <a:t>midterm/final </a:t>
+            </a:r>
+            <a:r>
+              <a:rPr lang="en-US" dirty="0" smtClean="0"/>
+              <a:t>exams</a:t>
+            </a:r>
+            <a:r>
+              <a:rPr lang="en-US" dirty="0" smtClean="0"/>
+              <a:t>!</a:t>
             </a:r>
           </a:p>
           <a:p>
@@ -5392,11 +5789,7 @@
             </a:r>
             <a:r>
               <a:rPr lang="en-US" dirty="0" smtClean="0"/>
-              <a:t> </a:t>
-            </a:r>
-            <a:r>
-              <a:rPr lang="en-US" dirty="0" smtClean="0"/>
-              <a:t>curves will be applied in final grading!</a:t>
+              <a:t> curves will be applied in final grading!</a:t>
             </a:r>
             <a:endParaRPr lang="en-US" dirty="0"/>
           </a:p>
@@ -5471,6 +5864,47 @@
           </a:p>
         </p:txBody>
       </p:sp>
+      <p:pic>
+        <p:nvPicPr>
+          <p:cNvPr id="1026" name="Picture 2" descr="http://www.greenprophet.com/wp-content/uploads/2013/06/Happiest-Baby-560x373.jpg"/>
+          <p:cNvPicPr>
+            <a:picLocks noChangeAspect="1" noChangeArrowheads="1"/>
+          </p:cNvPicPr>
+          <p:nvPr/>
+        </p:nvPicPr>
+        <p:blipFill>
+          <a:blip r:embed="rId2" cstate="print">
+            <a:extLst>
+              <a:ext uri="{28A0092B-C50C-407E-A947-70E740481C1C}">
+                <a14:useLocalDpi xmlns:a14="http://schemas.microsoft.com/office/drawing/2010/main" val="0"/>
+              </a:ext>
+            </a:extLst>
+          </a:blip>
+          <a:srcRect/>
+          <a:stretch>
+            <a:fillRect/>
+          </a:stretch>
+        </p:blipFill>
+        <p:spPr bwMode="auto">
+          <a:xfrm>
+            <a:off x="5943600" y="4495800"/>
+            <a:ext cx="1409488" cy="938819"/>
+          </a:xfrm>
+          <a:prstGeom prst="rect">
+            <a:avLst/>
+          </a:prstGeom>
+          <a:noFill/>
+          <a:extLst>
+            <a:ext uri="{909E8E84-426E-40DD-AFC4-6F175D3DCCD1}">
+              <a14:hiddenFill xmlns:a14="http://schemas.microsoft.com/office/drawing/2010/main">
+                <a:solidFill>
+                  <a:srgbClr val="FFFFFF"/>
+                </a:solidFill>
+              </a14:hiddenFill>
+            </a:ext>
+          </a:extLst>
+        </p:spPr>
+      </p:pic>
     </p:spTree>
     <p:extLst>
       <p:ext uri="{BB962C8B-B14F-4D97-AF65-F5344CB8AC3E}">
@@ -5481,6 +5915,179 @@
   <p:clrMapOvr>
     <a:masterClrMapping/>
   </p:clrMapOvr>
+  <p:timing>
+    <p:tnLst>
+      <p:par>
+        <p:cTn id="1" dur="indefinite" restart="never" nodeType="tmRoot">
+          <p:childTnLst>
+            <p:seq concurrent="1" nextAc="seek">
+              <p:cTn id="2" dur="indefinite" nodeType="mainSeq">
+                <p:childTnLst>
+                  <p:par>
+                    <p:cTn id="3" fill="hold">
+                      <p:stCondLst>
+                        <p:cond delay="indefinite"/>
+                      </p:stCondLst>
+                      <p:childTnLst>
+                        <p:par>
+                          <p:cTn id="4" fill="hold">
+                            <p:stCondLst>
+                              <p:cond delay="0"/>
+                            </p:stCondLst>
+                            <p:childTnLst>
+                              <p:par>
+                                <p:cTn id="5" presetID="1" presetClass="entr" presetSubtype="0" fill="hold" nodeType="clickEffect">
+                                  <p:stCondLst>
+                                    <p:cond delay="0"/>
+                                  </p:stCondLst>
+                                  <p:childTnLst>
+                                    <p:set>
+                                      <p:cBhvr>
+                                        <p:cTn id="6" dur="1" fill="hold">
+                                          <p:stCondLst>
+                                            <p:cond delay="0"/>
+                                          </p:stCondLst>
+                                        </p:cTn>
+                                        <p:tgtEl>
+                                          <p:spTgt spid="3">
+                                            <p:txEl>
+                                              <p:pRg st="8" end="8"/>
+                                            </p:txEl>
+                                          </p:spTgt>
+                                        </p:tgtEl>
+                                        <p:attrNameLst>
+                                          <p:attrName>style.visibility</p:attrName>
+                                        </p:attrNameLst>
+                                      </p:cBhvr>
+                                      <p:to>
+                                        <p:strVal val="visible"/>
+                                      </p:to>
+                                    </p:set>
+                                  </p:childTnLst>
+                                </p:cTn>
+                              </p:par>
+                            </p:childTnLst>
+                          </p:cTn>
+                        </p:par>
+                      </p:childTnLst>
+                    </p:cTn>
+                  </p:par>
+                  <p:par>
+                    <p:cTn id="7" fill="hold">
+                      <p:stCondLst>
+                        <p:cond delay="indefinite"/>
+                      </p:stCondLst>
+                      <p:childTnLst>
+                        <p:par>
+                          <p:cTn id="8" fill="hold">
+                            <p:stCondLst>
+                              <p:cond delay="0"/>
+                            </p:stCondLst>
+                            <p:childTnLst>
+                              <p:par>
+                                <p:cTn id="9" presetID="1" presetClass="entr" presetSubtype="0" fill="hold" nodeType="clickEffect">
+                                  <p:stCondLst>
+                                    <p:cond delay="0"/>
+                                  </p:stCondLst>
+                                  <p:childTnLst>
+                                    <p:set>
+                                      <p:cBhvr>
+                                        <p:cTn id="10" dur="1" fill="hold">
+                                          <p:stCondLst>
+                                            <p:cond delay="0"/>
+                                          </p:stCondLst>
+                                        </p:cTn>
+                                        <p:tgtEl>
+                                          <p:spTgt spid="1026"/>
+                                        </p:tgtEl>
+                                        <p:attrNameLst>
+                                          <p:attrName>style.visibility</p:attrName>
+                                        </p:attrNameLst>
+                                      </p:cBhvr>
+                                      <p:to>
+                                        <p:strVal val="visible"/>
+                                      </p:to>
+                                    </p:set>
+                                  </p:childTnLst>
+                                </p:cTn>
+                              </p:par>
+                            </p:childTnLst>
+                          </p:cTn>
+                        </p:par>
+                      </p:childTnLst>
+                    </p:cTn>
+                  </p:par>
+                  <p:par>
+                    <p:cTn id="11" fill="hold">
+                      <p:stCondLst>
+                        <p:cond delay="indefinite"/>
+                      </p:stCondLst>
+                      <p:childTnLst>
+                        <p:par>
+                          <p:cTn id="12" fill="hold">
+                            <p:stCondLst>
+                              <p:cond delay="0"/>
+                            </p:stCondLst>
+                            <p:childTnLst>
+                              <p:par>
+                                <p:cTn id="13" presetID="1" presetClass="entr" presetSubtype="0" fill="hold" nodeType="clickEffect">
+                                  <p:stCondLst>
+                                    <p:cond delay="0"/>
+                                  </p:stCondLst>
+                                  <p:childTnLst>
+                                    <p:set>
+                                      <p:cBhvr>
+                                        <p:cTn id="14" dur="1" fill="hold">
+                                          <p:stCondLst>
+                                            <p:cond delay="0"/>
+                                          </p:stCondLst>
+                                        </p:cTn>
+                                        <p:tgtEl>
+                                          <p:spTgt spid="3">
+                                            <p:txEl>
+                                              <p:pRg st="9" end="9"/>
+                                            </p:txEl>
+                                          </p:spTgt>
+                                        </p:tgtEl>
+                                        <p:attrNameLst>
+                                          <p:attrName>style.visibility</p:attrName>
+                                        </p:attrNameLst>
+                                      </p:cBhvr>
+                                      <p:to>
+                                        <p:strVal val="visible"/>
+                                      </p:to>
+                                    </p:set>
+                                  </p:childTnLst>
+                                </p:cTn>
+                              </p:par>
+                            </p:childTnLst>
+                          </p:cTn>
+                        </p:par>
+                      </p:childTnLst>
+                    </p:cTn>
+                  </p:par>
+                </p:childTnLst>
+              </p:cTn>
+              <p:prevCondLst>
+                <p:cond evt="onPrev" delay="0">
+                  <p:tgtEl>
+                    <p:sldTgt/>
+                  </p:tgtEl>
+                </p:cond>
+              </p:prevCondLst>
+              <p:nextCondLst>
+                <p:cond evt="onNext" delay="0">
+                  <p:tgtEl>
+                    <p:sldTgt/>
+                  </p:tgtEl>
+                </p:cond>
+              </p:nextCondLst>
+            </p:seq>
+          </p:childTnLst>
+        </p:cTn>
+      </p:par>
+    </p:tnLst>
+  </p:timing>
 </p:sld>
 </file>
 
@@ -5518,7 +6125,7 @@
           <a:p>
             <a:r>
               <a:rPr lang="en-US" dirty="0" smtClean="0"/>
-              <a:t>Paper presentation</a:t>
+              <a:t>Quizzes</a:t>
             </a:r>
             <a:endParaRPr lang="en-US" dirty="0"/>
           </a:p>
@@ -5537,61 +6144,98 @@
         <p:spPr/>
         <p:txBody>
           <a:bodyPr>
-            <a:normAutofit/>
+            <a:normAutofit lnSpcReduction="10000"/>
           </a:bodyPr>
           <a:lstStyle/>
           <a:p>
             <a:r>
               <a:rPr lang="en-US" dirty="0" smtClean="0"/>
-              <a:t>Let students present the state-of-the-art  research related to text mining</a:t>
+              <a:t>Format</a:t>
             </a:r>
           </a:p>
           <a:p>
             <a:pPr lvl="1"/>
             <a:r>
+              <a:rPr lang="en-US" dirty="0" smtClean="0"/>
+              <a:t>True/False questions</a:t>
+            </a:r>
+          </a:p>
+          <a:p>
+            <a:pPr lvl="1"/>
+            <a:r>
+              <a:rPr lang="en-US" dirty="0" smtClean="0"/>
+              <a:t>Multiple choice questions</a:t>
+            </a:r>
+          </a:p>
+          <a:p>
+            <a:pPr lvl="1"/>
+            <a:r>
+              <a:rPr lang="en-US" dirty="0" smtClean="0"/>
+              <a:t>Short answer questions</a:t>
+            </a:r>
+          </a:p>
+          <a:p>
+            <a:r>
+              <a:rPr lang="en-US" dirty="0" smtClean="0"/>
+              <a:t>Schedule</a:t>
+            </a:r>
+          </a:p>
+          <a:p>
+            <a:pPr lvl="1"/>
+            <a:r>
+              <a:rPr lang="en-US" dirty="0" smtClean="0"/>
+              <a:t>After each major lecture topic</a:t>
+            </a:r>
+          </a:p>
+          <a:p>
+            <a:pPr lvl="1"/>
+            <a:r>
+              <a:rPr lang="en-US" dirty="0" smtClean="0"/>
+              <a:t>Will be informed one week before the quiz</a:t>
+            </a:r>
+          </a:p>
+          <a:p>
+            <a:r>
+              <a:rPr lang="en-US" u="sng" dirty="0" smtClean="0"/>
+              <a:t>Closed</a:t>
+            </a:r>
+            <a:r>
+              <a:rPr lang="en-US" dirty="0" smtClean="0"/>
+              <a:t> </a:t>
+            </a:r>
+            <a:r>
               <a:rPr lang="en-US" dirty="0"/>
-              <a:t>Choosing from recommended </a:t>
-            </a:r>
-            <a:r>
-              <a:rPr lang="en-US" dirty="0" smtClean="0"/>
-              <a:t>readings, or your favorite paper outside the list</a:t>
+              <a:t>book and </a:t>
+            </a:r>
+            <a:r>
+              <a:rPr lang="en-US" u="sng" dirty="0"/>
+              <a:t>closed</a:t>
+            </a:r>
+            <a:r>
+              <a:rPr lang="en-US" dirty="0"/>
+              <a:t> </a:t>
+            </a:r>
+            <a:r>
+              <a:rPr lang="en-US" dirty="0" smtClean="0"/>
+              <a:t>notes</a:t>
             </a:r>
           </a:p>
           <a:p>
             <a:pPr lvl="1"/>
             <a:r>
               <a:rPr lang="en-US" dirty="0" smtClean="0"/>
-              <a:t>15-mins presentation including 2-mins Q&amp;A</a:t>
-            </a:r>
-            <a:endParaRPr lang="en-US" dirty="0"/>
-          </a:p>
-          <a:p>
-            <a:pPr lvl="1"/>
-            <a:r>
-              <a:rPr lang="en-US" dirty="0" smtClean="0"/>
-              <a:t>One paper one student </a:t>
-            </a:r>
-          </a:p>
-          <a:p>
-            <a:pPr lvl="1"/>
-            <a:r>
-              <a:rPr lang="en-US" dirty="0" smtClean="0"/>
-              <a:t>Register your choice early, first come first serve</a:t>
-            </a:r>
-          </a:p>
-          <a:p>
-            <a:pPr lvl="1"/>
-            <a:r>
-              <a:rPr lang="en-US" dirty="0" smtClean="0"/>
-              <a:t>Will be graded by the instructor and other students </a:t>
-            </a:r>
-            <a:endParaRPr lang="en-US" dirty="0"/>
-          </a:p>
-        </p:txBody>
-      </p:sp>
-      <p:sp>
-        <p:nvSpPr>
-          <p:cNvPr id="6" name="Date Placeholder 5"/>
+              <a:t>No </a:t>
+            </a:r>
+            <a:r>
+              <a:rPr lang="en-US" dirty="0"/>
+              <a:t>electronic aids or cheat sheets</a:t>
+            </a:r>
+          </a:p>
+        </p:txBody>
+      </p:sp>
+      <p:sp>
+        <p:nvSpPr>
+          <p:cNvPr id="4" name="Date Placeholder 3"/>
           <p:cNvSpPr>
             <a:spLocks noGrp="1"/>
           </p:cNvSpPr>
@@ -5614,7 +6258,7 @@
       </p:sp>
       <p:sp>
         <p:nvSpPr>
-          <p:cNvPr id="7" name="Footer Placeholder 6"/>
+          <p:cNvPr id="5" name="Footer Placeholder 4"/>
           <p:cNvSpPr>
             <a:spLocks noGrp="1"/>
           </p:cNvSpPr>
@@ -5637,7 +6281,7 @@
       </p:sp>
       <p:sp>
         <p:nvSpPr>
-          <p:cNvPr id="8" name="Slide Number Placeholder 7"/>
+          <p:cNvPr id="6" name="Slide Number Placeholder 5"/>
           <p:cNvSpPr>
             <a:spLocks noGrp="1"/>
           </p:cNvSpPr>
@@ -5661,7 +6305,7 @@
     </p:spTree>
     <p:extLst>
       <p:ext uri="{BB962C8B-B14F-4D97-AF65-F5344CB8AC3E}">
-        <p14:creationId xmlns:p14="http://schemas.microsoft.com/office/powerpoint/2010/main" val="124379478"/>
+        <p14:creationId xmlns:p14="http://schemas.microsoft.com/office/powerpoint/2010/main" val="3487711243"/>
       </p:ext>
     </p:extLst>
   </p:cSld>
@@ -5712,7 +6356,7 @@
           <a:p>
             <a:r>
               <a:rPr lang="en-US" dirty="0" smtClean="0"/>
-              <a:t>Course project</a:t>
+              <a:t>Paper presentation</a:t>
             </a:r>
             <a:endParaRPr lang="en-US" dirty="0"/>
           </a:p>
@@ -5728,127 +6372,57 @@
             <p:ph idx="1"/>
           </p:nvPr>
         </p:nvSpPr>
-        <p:spPr>
-          <a:xfrm>
-            <a:off x="457200" y="1600200"/>
-            <a:ext cx="8229600" cy="4572000"/>
-          </a:xfrm>
-        </p:spPr>
+        <p:spPr/>
         <p:txBody>
           <a:bodyPr>
-            <a:normAutofit fontScale="92500" lnSpcReduction="20000"/>
+            <a:normAutofit/>
           </a:bodyPr>
           <a:lstStyle/>
           <a:p>
             <a:r>
               <a:rPr lang="en-US" dirty="0" smtClean="0"/>
-              <a:t>Appreciate research-oriented </a:t>
-            </a:r>
+              <a:t>Let students present the state-of-the-art  research related to text mining</a:t>
+            </a:r>
+          </a:p>
+          <a:p>
+            <a:pPr lvl="1"/>
             <a:r>
               <a:rPr lang="en-US" dirty="0"/>
-              <a:t>problems or </a:t>
-            </a:r>
-            <a:r>
-              <a:rPr lang="en-US" dirty="0" smtClean="0"/>
-              <a:t>“deliverables”</a:t>
+              <a:t>Choosing from recommended </a:t>
+            </a:r>
+            <a:r>
+              <a:rPr lang="en-US" dirty="0" smtClean="0"/>
+              <a:t>readings, or your favorite paper outside the list</a:t>
             </a:r>
           </a:p>
           <a:p>
             <a:pPr lvl="1"/>
             <a:r>
               <a:rPr lang="en-US" dirty="0" smtClean="0"/>
-              <a:t>Work in groups (</a:t>
-            </a:r>
-            <a:r>
-              <a:rPr lang="en-US" i="1" dirty="0" smtClean="0"/>
-              <a:t>not required</a:t>
-            </a:r>
-            <a:r>
-              <a:rPr lang="en-US" dirty="0" smtClean="0"/>
-              <a:t>)</a:t>
-            </a:r>
-          </a:p>
-          <a:p>
-            <a:pPr lvl="2"/>
-            <a:r>
-              <a:rPr lang="en-US" dirty="0" smtClean="0"/>
-              <a:t>Up to three students</a:t>
-            </a:r>
+              <a:t>15-mins presentation including 2-mins Q&amp;A</a:t>
+            </a:r>
+            <a:endParaRPr lang="en-US" dirty="0"/>
           </a:p>
           <a:p>
             <a:pPr lvl="1"/>
             <a:r>
-              <a:rPr lang="en-US" dirty="0"/>
-              <a:t>Project </a:t>
-            </a:r>
-            <a:r>
-              <a:rPr lang="en-US" dirty="0" smtClean="0"/>
-              <a:t>proposal (20%)</a:t>
-            </a:r>
-          </a:p>
-          <a:p>
-            <a:pPr lvl="2"/>
-            <a:r>
-              <a:rPr lang="en-US" dirty="0" smtClean="0"/>
-              <a:t>Discuss your topic with peers or the instructor</a:t>
-            </a:r>
-          </a:p>
-          <a:p>
-            <a:pPr lvl="2"/>
-            <a:r>
-              <a:rPr lang="en-US" dirty="0" smtClean="0"/>
-              <a:t>Written report</a:t>
+              <a:rPr lang="en-US" dirty="0" smtClean="0"/>
+              <a:t>One paper one student </a:t>
             </a:r>
           </a:p>
           <a:p>
             <a:pPr lvl="1"/>
             <a:r>
-              <a:rPr lang="en-US" dirty="0"/>
-              <a:t>Project </a:t>
-            </a:r>
-            <a:r>
-              <a:rPr lang="en-US" dirty="0" smtClean="0"/>
-              <a:t>report (40%)</a:t>
-            </a:r>
-          </a:p>
-          <a:p>
-            <a:pPr lvl="2"/>
-            <a:r>
-              <a:rPr lang="en-US" dirty="0" smtClean="0"/>
-              <a:t>Due </a:t>
-            </a:r>
-            <a:r>
-              <a:rPr lang="en-US" b="1" dirty="0" smtClean="0"/>
-              <a:t>before</a:t>
-            </a:r>
-            <a:r>
-              <a:rPr lang="en-US" dirty="0" smtClean="0"/>
-              <a:t> the final presentation</a:t>
+              <a:rPr lang="en-US" dirty="0" smtClean="0"/>
+              <a:t>Register your choice early, first come first serve</a:t>
             </a:r>
           </a:p>
           <a:p>
             <a:pPr lvl="1"/>
             <a:r>
               <a:rPr lang="en-US" dirty="0" smtClean="0"/>
-              <a:t>Project presentation (40%)</a:t>
-            </a:r>
-          </a:p>
-          <a:p>
-            <a:pPr lvl="2"/>
-            <a:r>
-              <a:rPr lang="en-US" dirty="0" smtClean="0"/>
-              <a:t>15-mins in-class presentation</a:t>
-            </a:r>
-          </a:p>
-          <a:p>
-            <a:pPr lvl="2"/>
-            <a:r>
-              <a:rPr lang="en-US" dirty="0" smtClean="0"/>
-              <a:t>5-mins Q&amp;A</a:t>
-            </a:r>
-          </a:p>
-          <a:p>
-            <a:pPr lvl="1"/>
+              <a:t>Will be graded by the instructor and other students </a:t>
+            </a:r>
             <a:endParaRPr lang="en-US" dirty="0"/>
           </a:p>
         </p:txBody>
@@ -5925,7 +6499,7 @@
     </p:spTree>
     <p:extLst>
       <p:ext uri="{BB962C8B-B14F-4D97-AF65-F5344CB8AC3E}">
-        <p14:creationId xmlns:p14="http://schemas.microsoft.com/office/powerpoint/2010/main" val="1790905027"/>
+        <p14:creationId xmlns:p14="http://schemas.microsoft.com/office/powerpoint/2010/main" val="124379478"/>
       </p:ext>
     </p:extLst>
   </p:cSld>
@@ -5976,7 +6550,7 @@
           <a:p>
             <a:r>
               <a:rPr lang="en-US" dirty="0" smtClean="0"/>
-              <a:t>Deadlines</a:t>
+              <a:t>Course project</a:t>
             </a:r>
             <a:endParaRPr lang="en-US" dirty="0"/>
           </a:p>
@@ -5995,130 +6569,131 @@
         <p:spPr>
           <a:xfrm>
             <a:off x="457200" y="1600200"/>
-            <a:ext cx="8229600" cy="4756150"/>
+            <a:ext cx="8229600" cy="4572000"/>
           </a:xfrm>
         </p:spPr>
         <p:txBody>
           <a:bodyPr>
-            <a:normAutofit/>
+            <a:normAutofit fontScale="92500" lnSpcReduction="20000"/>
           </a:bodyPr>
           <a:lstStyle/>
           <a:p>
             <a:r>
               <a:rPr lang="en-US" dirty="0" smtClean="0"/>
-              <a:t>Machine problems</a:t>
+              <a:t>Appreciate research-oriented </a:t>
+            </a:r>
+            <a:r>
+              <a:rPr lang="en-US" dirty="0"/>
+              <a:t>problems or </a:t>
+            </a:r>
+            <a:r>
+              <a:rPr lang="en-US" dirty="0" smtClean="0"/>
+              <a:t>“deliverables”</a:t>
             </a:r>
           </a:p>
           <a:p>
             <a:pPr lvl="1"/>
             <a:r>
               <a:rPr lang="en-US" dirty="0" smtClean="0"/>
-              <a:t>Due in 7-days after posting</a:t>
-            </a:r>
-          </a:p>
-          <a:p>
-            <a:r>
-              <a:rPr lang="en-US" dirty="0" smtClean="0"/>
-              <a:t>Paper presentation</a:t>
-            </a:r>
+              <a:t>Work in groups (</a:t>
+            </a:r>
+            <a:r>
+              <a:rPr lang="en-US" i="1" dirty="0" smtClean="0"/>
+              <a:t>not required</a:t>
+            </a:r>
+            <a:r>
+              <a:rPr lang="en-US" dirty="0" smtClean="0"/>
+              <a:t>)</a:t>
+            </a:r>
+          </a:p>
+          <a:p>
+            <a:pPr lvl="2"/>
+            <a:r>
+              <a:rPr lang="en-US" dirty="0" smtClean="0"/>
+              <a:t>Up to </a:t>
+            </a:r>
+            <a:r>
+              <a:rPr lang="en-US" dirty="0" smtClean="0"/>
+              <a:t>3 students</a:t>
+            </a:r>
+            <a:endParaRPr lang="en-US" dirty="0" smtClean="0"/>
           </a:p>
           <a:p>
             <a:pPr lvl="1"/>
             <a:r>
-              <a:rPr lang="en-US" dirty="0" smtClean="0"/>
-              <a:t>Sign </a:t>
-            </a:r>
-            <a:r>
               <a:rPr lang="en-US" dirty="0"/>
-              <a:t>up is due </a:t>
-            </a:r>
-            <a:r>
-              <a:rPr lang="en-US" dirty="0" smtClean="0"/>
-              <a:t>in </a:t>
-            </a:r>
-            <a:r>
-              <a:rPr lang="en-US" b="1" dirty="0"/>
-              <a:t>the end of </a:t>
+              <a:t>Project </a:t>
+            </a:r>
+            <a:r>
+              <a:rPr lang="en-US" dirty="0" smtClean="0"/>
+              <a:t>proposal (20%)</a:t>
+            </a:r>
+          </a:p>
+          <a:p>
+            <a:pPr lvl="2"/>
+            <a:r>
+              <a:rPr lang="en-US" dirty="0" smtClean="0"/>
+              <a:t>Discuss your topic with peers or the </a:t>
+            </a:r>
+            <a:r>
+              <a:rPr lang="en-US" dirty="0" smtClean="0"/>
+              <a:t>instructor first</a:t>
+            </a:r>
+            <a:endParaRPr lang="en-US" dirty="0" smtClean="0"/>
+          </a:p>
+          <a:p>
+            <a:pPr lvl="2"/>
+            <a:r>
+              <a:rPr lang="en-US" dirty="0" smtClean="0"/>
+              <a:t>Written report</a:t>
+            </a:r>
+          </a:p>
+          <a:p>
+            <a:pPr lvl="1"/>
+            <a:r>
+              <a:rPr lang="en-US" dirty="0"/>
+              <a:t>Project </a:t>
+            </a:r>
+            <a:r>
+              <a:rPr lang="en-US" dirty="0" smtClean="0"/>
+              <a:t>report (40%)</a:t>
+            </a:r>
+          </a:p>
+          <a:p>
+            <a:pPr lvl="2"/>
+            <a:r>
+              <a:rPr lang="en-US" dirty="0" smtClean="0"/>
+              <a:t>Due </a:t>
             </a:r>
             <a:r>
               <a:rPr lang="en-US" b="1" dirty="0" smtClean="0"/>
-              <a:t>6</a:t>
-            </a:r>
-            <a:r>
-              <a:rPr lang="en-US" b="1" baseline="30000" dirty="0" smtClean="0"/>
-              <a:t>th</a:t>
-            </a:r>
-            <a:r>
-              <a:rPr lang="en-US" b="1" dirty="0" smtClean="0"/>
-              <a:t> week</a:t>
+              <a:t>before</a:t>
+            </a:r>
+            <a:r>
+              <a:rPr lang="en-US" dirty="0" smtClean="0"/>
+              <a:t> the final presentation</a:t>
             </a:r>
           </a:p>
           <a:p>
             <a:pPr lvl="1"/>
             <a:r>
               <a:rPr lang="en-US" dirty="0" smtClean="0"/>
-              <a:t>Presentation starts on the </a:t>
-            </a:r>
-            <a:r>
-              <a:rPr lang="en-US" b="1" dirty="0" smtClean="0"/>
-              <a:t>7</a:t>
-            </a:r>
-            <a:r>
-              <a:rPr lang="en-US" b="1" baseline="30000" dirty="0" smtClean="0"/>
-              <a:t>th</a:t>
-            </a:r>
-            <a:r>
-              <a:rPr lang="en-US" b="1" dirty="0" smtClean="0"/>
-              <a:t> week</a:t>
-            </a:r>
-          </a:p>
-          <a:p>
-            <a:r>
-              <a:rPr lang="en-US" dirty="0" smtClean="0"/>
-              <a:t>Project</a:t>
-            </a:r>
-          </a:p>
-          <a:p>
-            <a:pPr lvl="1"/>
-            <a:r>
-              <a:rPr lang="en-US" dirty="0" smtClean="0"/>
-              <a:t>Proposal due in </a:t>
-            </a:r>
-            <a:r>
-              <a:rPr lang="en-US" b="1" dirty="0"/>
-              <a:t>the end of </a:t>
-            </a:r>
-            <a:r>
-              <a:rPr lang="en-US" b="1" dirty="0" smtClean="0"/>
-              <a:t>5</a:t>
-            </a:r>
-            <a:r>
-              <a:rPr lang="en-US" b="1" baseline="30000" dirty="0" smtClean="0"/>
-              <a:t>th</a:t>
-            </a:r>
-            <a:r>
-              <a:rPr lang="en-US" b="1" dirty="0" smtClean="0"/>
-              <a:t> week</a:t>
-            </a:r>
-          </a:p>
-          <a:p>
-            <a:pPr lvl="1"/>
-            <a:r>
-              <a:rPr lang="en-US" dirty="0" smtClean="0"/>
-              <a:t>Presentation </a:t>
-            </a:r>
-            <a:r>
-              <a:rPr lang="en-US" dirty="0" smtClean="0"/>
-              <a:t>in the last </a:t>
-            </a:r>
-            <a:r>
-              <a:rPr lang="en-US" dirty="0" smtClean="0"/>
-              <a:t>two lectures of the semester</a:t>
-            </a:r>
-          </a:p>
-          <a:p>
-            <a:pPr lvl="1"/>
-            <a:endParaRPr lang="en-US" dirty="0" smtClean="0"/>
+              <a:t>Project presentation (40%)</a:t>
+            </a:r>
+          </a:p>
+          <a:p>
+            <a:pPr lvl="2"/>
+            <a:r>
+              <a:rPr lang="en-US" dirty="0" smtClean="0"/>
+              <a:t>15-mins in-class presentation</a:t>
+            </a:r>
+          </a:p>
+          <a:p>
+            <a:pPr lvl="2"/>
+            <a:r>
+              <a:rPr lang="en-US" dirty="0" smtClean="0"/>
+              <a:t>5-mins Q&amp;A</a:t>
+            </a:r>
           </a:p>
           <a:p>
             <a:pPr lvl="1"/>
@@ -6128,7 +6703,7 @@
       </p:sp>
       <p:sp>
         <p:nvSpPr>
-          <p:cNvPr id="4" name="Date Placeholder 3"/>
+          <p:cNvPr id="6" name="Date Placeholder 5"/>
           <p:cNvSpPr>
             <a:spLocks noGrp="1"/>
           </p:cNvSpPr>
@@ -6151,7 +6726,7 @@
       </p:sp>
       <p:sp>
         <p:nvSpPr>
-          <p:cNvPr id="5" name="Footer Placeholder 4"/>
+          <p:cNvPr id="7" name="Footer Placeholder 6"/>
           <p:cNvSpPr>
             <a:spLocks noGrp="1"/>
           </p:cNvSpPr>
@@ -6174,7 +6749,7 @@
       </p:sp>
       <p:sp>
         <p:nvSpPr>
-          <p:cNvPr id="6" name="Slide Number Placeholder 5"/>
+          <p:cNvPr id="8" name="Slide Number Placeholder 7"/>
           <p:cNvSpPr>
             <a:spLocks noGrp="1"/>
           </p:cNvSpPr>
@@ -6198,13 +6773,20 @@
     </p:spTree>
     <p:extLst>
       <p:ext uri="{BB962C8B-B14F-4D97-AF65-F5344CB8AC3E}">
-        <p14:creationId xmlns:p14="http://schemas.microsoft.com/office/powerpoint/2010/main" val="650771550"/>
+        <p14:creationId xmlns:p14="http://schemas.microsoft.com/office/powerpoint/2010/main" val="1790905027"/>
       </p:ext>
     </p:extLst>
   </p:cSld>
   <p:clrMapOvr>
     <a:masterClrMapping/>
   </p:clrMapOvr>
+  <p:timing>
+    <p:tnLst>
+      <p:par>
+        <p:cTn id="1" dur="indefinite" restart="never" nodeType="tmRoot"/>
+      </p:par>
+    </p:tnLst>
+  </p:timing>
 </p:sld>
 </file>
 
@@ -6242,7 +6824,7 @@
           <a:p>
             <a:r>
               <a:rPr lang="en-US" dirty="0" smtClean="0"/>
-              <a:t>Late policy</a:t>
+              <a:t>Deadlines</a:t>
             </a:r>
             <a:endParaRPr lang="en-US" dirty="0"/>
           </a:p>
@@ -6266,98 +6848,125 @@
         </p:spPr>
         <p:txBody>
           <a:bodyPr>
-            <a:normAutofit fontScale="85000" lnSpcReduction="20000"/>
+            <a:normAutofit/>
           </a:bodyPr>
           <a:lstStyle/>
           <a:p>
             <a:r>
               <a:rPr lang="en-US" dirty="0" smtClean="0"/>
-              <a:t>Homework</a:t>
+              <a:t>Machine problems</a:t>
             </a:r>
           </a:p>
           <a:p>
             <a:pPr lvl="1"/>
             <a:r>
               <a:rPr lang="en-US" dirty="0" smtClean="0"/>
-              <a:t>Everyone will have one chance to ask for extension (extra three days after deadline)</a:t>
+              <a:t>Due in 7-days after posting</a:t>
+            </a:r>
+          </a:p>
+          <a:p>
+            <a:r>
+              <a:rPr lang="en-US" dirty="0" smtClean="0"/>
+              <a:t>Paper presentation</a:t>
             </a:r>
           </a:p>
           <a:p>
             <a:pPr lvl="1"/>
             <a:r>
               <a:rPr lang="en-US" dirty="0" smtClean="0"/>
-              <a:t>Request must be made </a:t>
+              <a:t>Sign </a:t>
+            </a:r>
+            <a:r>
+              <a:rPr lang="en-US" dirty="0"/>
+              <a:t>up is due </a:t>
+            </a:r>
+            <a:r>
+              <a:rPr lang="en-US" dirty="0" smtClean="0"/>
+              <a:t>in </a:t>
+            </a:r>
+            <a:r>
+              <a:rPr lang="en-US" b="1" dirty="0"/>
+              <a:t>the end of </a:t>
             </a:r>
             <a:r>
               <a:rPr lang="en-US" b="1" dirty="0" smtClean="0"/>
-              <a:t>before</a:t>
-            </a:r>
-            <a:r>
-              <a:rPr lang="en-US" dirty="0" smtClean="0"/>
-              <a:t> the deadline!</a:t>
-            </a:r>
-          </a:p>
-          <a:p>
-            <a:r>
-              <a:rPr lang="en-US" dirty="0" smtClean="0"/>
-              <a:t>Midterm</a:t>
+              <a:t>6</a:t>
+            </a:r>
+            <a:r>
+              <a:rPr lang="en-US" b="1" baseline="30000" dirty="0" smtClean="0"/>
+              <a:t>th</a:t>
+            </a:r>
+            <a:r>
+              <a:rPr lang="en-US" b="1" dirty="0" smtClean="0"/>
+              <a:t> week</a:t>
             </a:r>
           </a:p>
           <a:p>
             <a:pPr lvl="1"/>
             <a:r>
+              <a:rPr lang="en-US" dirty="0" smtClean="0"/>
+              <a:t>Presentation starts on the </a:t>
+            </a:r>
+            <a:r>
               <a:rPr lang="en-US" b="1" dirty="0" smtClean="0"/>
-              <a:t>No</a:t>
-            </a:r>
-            <a:r>
-              <a:rPr lang="en-US" dirty="0" smtClean="0"/>
-              <a:t> make-up exams unless under emergency situation</a:t>
-            </a:r>
-          </a:p>
-          <a:p>
-            <a:r>
-              <a:rPr lang="en-US" dirty="0" smtClean="0"/>
-              <a:t>Paper presentation</a:t>
+              <a:t>7</a:t>
+            </a:r>
+            <a:r>
+              <a:rPr lang="en-US" b="1" baseline="30000" dirty="0" smtClean="0"/>
+              <a:t>th</a:t>
+            </a:r>
+            <a:r>
+              <a:rPr lang="en-US" b="1" dirty="0" smtClean="0"/>
+              <a:t> week</a:t>
+            </a:r>
+          </a:p>
+          <a:p>
+            <a:r>
+              <a:rPr lang="en-US" dirty="0" smtClean="0"/>
+              <a:t>Project</a:t>
             </a:r>
           </a:p>
           <a:p>
             <a:pPr lvl="1"/>
             <a:r>
               <a:rPr lang="en-US" dirty="0" smtClean="0"/>
-              <a:t>Must be presented on your selected date</a:t>
-            </a:r>
-          </a:p>
-          <a:p>
-            <a:r>
-              <a:rPr lang="en-US" dirty="0"/>
-              <a:t>Course </a:t>
-            </a:r>
-            <a:r>
-              <a:rPr lang="en-US" dirty="0" smtClean="0"/>
-              <a:t>project</a:t>
+              <a:t>Proposal due in </a:t>
+            </a:r>
+            <a:r>
+              <a:rPr lang="en-US" b="1" dirty="0"/>
+              <a:t>the end of </a:t>
+            </a:r>
+            <a:r>
+              <a:rPr lang="en-US" b="1" dirty="0" smtClean="0"/>
+              <a:t>5</a:t>
+            </a:r>
+            <a:r>
+              <a:rPr lang="en-US" b="1" baseline="30000" dirty="0" smtClean="0"/>
+              <a:t>th</a:t>
+            </a:r>
+            <a:r>
+              <a:rPr lang="en-US" b="1" dirty="0" smtClean="0"/>
+              <a:t> week</a:t>
             </a:r>
           </a:p>
           <a:p>
             <a:pPr lvl="1"/>
             <a:r>
               <a:rPr lang="en-US" dirty="0" smtClean="0"/>
-              <a:t>Proposal due early in the semester (~5</a:t>
-            </a:r>
-            <a:r>
-              <a:rPr lang="en-US" baseline="30000" dirty="0" smtClean="0"/>
-              <a:t>th</a:t>
-            </a:r>
-            <a:r>
-              <a:rPr lang="en-US" dirty="0" smtClean="0"/>
-              <a:t> week, no extension)</a:t>
+              <a:t>Presentation in the last </a:t>
+            </a:r>
+            <a:r>
+              <a:rPr lang="en-US" dirty="0" smtClean="0"/>
+              <a:t>week of </a:t>
+            </a:r>
+            <a:r>
+              <a:rPr lang="en-US" dirty="0" smtClean="0"/>
+              <a:t>the semester</a:t>
             </a:r>
           </a:p>
           <a:p>
             <a:pPr lvl="1"/>
-            <a:r>
-              <a:rPr lang="en-US" dirty="0" smtClean="0"/>
-              <a:t>Final report due before presentation (no extension)</a:t>
-            </a:r>
+            <a:endParaRPr lang="en-US" dirty="0" smtClean="0"/>
           </a:p>
           <a:p>
             <a:pPr lvl="1"/>
@@ -6367,7 +6976,7 @@
       </p:sp>
       <p:sp>
         <p:nvSpPr>
-          <p:cNvPr id="6" name="Date Placeholder 5"/>
+          <p:cNvPr id="4" name="Date Placeholder 3"/>
           <p:cNvSpPr>
             <a:spLocks noGrp="1"/>
           </p:cNvSpPr>
@@ -6390,7 +6999,7 @@
       </p:sp>
       <p:sp>
         <p:nvSpPr>
-          <p:cNvPr id="7" name="Footer Placeholder 6"/>
+          <p:cNvPr id="5" name="Footer Placeholder 4"/>
           <p:cNvSpPr>
             <a:spLocks noGrp="1"/>
           </p:cNvSpPr>
@@ -6413,7 +7022,7 @@
       </p:sp>
       <p:sp>
         <p:nvSpPr>
-          <p:cNvPr id="8" name="Slide Number Placeholder 7"/>
+          <p:cNvPr id="6" name="Slide Number Placeholder 5"/>
           <p:cNvSpPr>
             <a:spLocks noGrp="1"/>
           </p:cNvSpPr>
@@ -6437,7 +7046,7 @@
     </p:spTree>
     <p:extLst>
       <p:ext uri="{BB962C8B-B14F-4D97-AF65-F5344CB8AC3E}">
-        <p14:creationId xmlns:p14="http://schemas.microsoft.com/office/powerpoint/2010/main" val="954530267"/>
+        <p14:creationId xmlns:p14="http://schemas.microsoft.com/office/powerpoint/2010/main" val="650771550"/>
       </p:ext>
     </p:extLst>
   </p:cSld>

</xml_diff>